<commit_message>
everything except the date
</commit_message>
<xml_diff>
--- a/Password Manager PPPT.pptx
+++ b/Password Manager PPPT.pptx
@@ -109,6 +109,11 @@
       </a:defRPr>
     </a:lvl9pPr>
   </p:defaultTextStyle>
+  <p:extLst>
+    <p:ext uri="{EFAFB233-063F-42B5-8137-9DF3F51BA10A}">
+      <p15:sldGuideLst xmlns:p15="http://schemas.microsoft.com/office/powerpoint/2012/main"/>
+    </p:ext>
+  </p:extLst>
 </p:presentation>
 </file>
 
@@ -834,7 +839,7 @@
           <a:p>
             <a:fld id="{E94B67AB-BEA9-4CCE-A570-C219E267327E}" type="datetimeFigureOut">
               <a:rPr lang="en-US" smtClean="0"/>
-              <a:t>12/4/2016</a:t>
+              <a:t>12/5/16</a:t>
             </a:fld>
             <a:endParaRPr lang="en-US"/>
           </a:p>
@@ -1085,7 +1090,7 @@
           <a:p>
             <a:fld id="{E94B67AB-BEA9-4CCE-A570-C219E267327E}" type="datetimeFigureOut">
               <a:rPr lang="en-US" smtClean="0"/>
-              <a:t>12/4/2016</a:t>
+              <a:t>12/5/16</a:t>
             </a:fld>
             <a:endParaRPr lang="en-US"/>
           </a:p>
@@ -1399,7 +1404,7 @@
           <a:p>
             <a:fld id="{E94B67AB-BEA9-4CCE-A570-C219E267327E}" type="datetimeFigureOut">
               <a:rPr lang="en-US" smtClean="0"/>
-              <a:t>12/4/2016</a:t>
+              <a:t>12/5/16</a:t>
             </a:fld>
             <a:endParaRPr lang="en-US"/>
           </a:p>
@@ -1740,7 +1745,7 @@
           <a:p>
             <a:fld id="{E94B67AB-BEA9-4CCE-A570-C219E267327E}" type="datetimeFigureOut">
               <a:rPr lang="en-US" smtClean="0"/>
-              <a:t>12/4/2016</a:t>
+              <a:t>12/5/16</a:t>
             </a:fld>
             <a:endParaRPr lang="en-US"/>
           </a:p>
@@ -2054,7 +2059,7 @@
           <a:p>
             <a:fld id="{E94B67AB-BEA9-4CCE-A570-C219E267327E}" type="datetimeFigureOut">
               <a:rPr lang="en-US" smtClean="0"/>
-              <a:t>12/4/2016</a:t>
+              <a:t>12/5/16</a:t>
             </a:fld>
             <a:endParaRPr lang="en-US"/>
           </a:p>
@@ -2447,7 +2452,7 @@
           <a:p>
             <a:fld id="{E94B67AB-BEA9-4CCE-A570-C219E267327E}" type="datetimeFigureOut">
               <a:rPr lang="en-US" smtClean="0"/>
-              <a:t>12/4/2016</a:t>
+              <a:t>12/5/16</a:t>
             </a:fld>
             <a:endParaRPr lang="en-US"/>
           </a:p>
@@ -2617,7 +2622,7 @@
           <a:p>
             <a:fld id="{E94B67AB-BEA9-4CCE-A570-C219E267327E}" type="datetimeFigureOut">
               <a:rPr lang="en-US" smtClean="0"/>
-              <a:t>12/4/2016</a:t>
+              <a:t>12/5/16</a:t>
             </a:fld>
             <a:endParaRPr lang="en-US"/>
           </a:p>
@@ -2797,7 +2802,7 @@
           <a:p>
             <a:fld id="{E94B67AB-BEA9-4CCE-A570-C219E267327E}" type="datetimeFigureOut">
               <a:rPr lang="en-US" smtClean="0"/>
-              <a:t>12/4/2016</a:t>
+              <a:t>12/5/16</a:t>
             </a:fld>
             <a:endParaRPr lang="en-US"/>
           </a:p>
@@ -2973,7 +2978,7 @@
           <a:p>
             <a:fld id="{E94B67AB-BEA9-4CCE-A570-C219E267327E}" type="datetimeFigureOut">
               <a:rPr lang="en-US" smtClean="0"/>
-              <a:t>12/4/2016</a:t>
+              <a:t>12/5/16</a:t>
             </a:fld>
             <a:endParaRPr lang="en-US"/>
           </a:p>
@@ -3220,7 +3225,7 @@
           <a:p>
             <a:fld id="{E94B67AB-BEA9-4CCE-A570-C219E267327E}" type="datetimeFigureOut">
               <a:rPr lang="en-US" smtClean="0"/>
-              <a:t>12/4/2016</a:t>
+              <a:t>12/5/16</a:t>
             </a:fld>
             <a:endParaRPr lang="en-US"/>
           </a:p>
@@ -3452,7 +3457,7 @@
           <a:p>
             <a:fld id="{E94B67AB-BEA9-4CCE-A570-C219E267327E}" type="datetimeFigureOut">
               <a:rPr lang="en-US" smtClean="0"/>
-              <a:t>12/4/2016</a:t>
+              <a:t>12/5/16</a:t>
             </a:fld>
             <a:endParaRPr lang="en-US"/>
           </a:p>
@@ -3826,7 +3831,7 @@
           <a:p>
             <a:fld id="{E94B67AB-BEA9-4CCE-A570-C219E267327E}" type="datetimeFigureOut">
               <a:rPr lang="en-US" smtClean="0"/>
-              <a:t>12/4/2016</a:t>
+              <a:t>12/5/16</a:t>
             </a:fld>
             <a:endParaRPr lang="en-US"/>
           </a:p>
@@ -3949,7 +3954,7 @@
           <a:p>
             <a:fld id="{E94B67AB-BEA9-4CCE-A570-C219E267327E}" type="datetimeFigureOut">
               <a:rPr lang="en-US" smtClean="0"/>
-              <a:t>12/4/2016</a:t>
+              <a:t>12/5/16</a:t>
             </a:fld>
             <a:endParaRPr lang="en-US"/>
           </a:p>
@@ -4044,7 +4049,7 @@
           <a:p>
             <a:fld id="{E94B67AB-BEA9-4CCE-A570-C219E267327E}" type="datetimeFigureOut">
               <a:rPr lang="en-US" smtClean="0"/>
-              <a:t>12/4/2016</a:t>
+              <a:t>12/5/16</a:t>
             </a:fld>
             <a:endParaRPr lang="en-US"/>
           </a:p>
@@ -4299,7 +4304,7 @@
           <a:p>
             <a:fld id="{E94B67AB-BEA9-4CCE-A570-C219E267327E}" type="datetimeFigureOut">
               <a:rPr lang="en-US" smtClean="0"/>
-              <a:t>12/4/2016</a:t>
+              <a:t>12/5/16</a:t>
             </a:fld>
             <a:endParaRPr lang="en-US"/>
           </a:p>
@@ -4562,7 +4567,7 @@
           <a:p>
             <a:fld id="{E94B67AB-BEA9-4CCE-A570-C219E267327E}" type="datetimeFigureOut">
               <a:rPr lang="en-US" smtClean="0"/>
-              <a:t>12/4/2016</a:t>
+              <a:t>12/5/16</a:t>
             </a:fld>
             <a:endParaRPr lang="en-US"/>
           </a:p>
@@ -5305,7 +5310,7 @@
           <a:p>
             <a:fld id="{E94B67AB-BEA9-4CCE-A570-C219E267327E}" type="datetimeFigureOut">
               <a:rPr lang="en-US" smtClean="0"/>
-              <a:t>12/4/2016</a:t>
+              <a:t>12/5/16</a:t>
             </a:fld>
             <a:endParaRPr lang="en-US"/>
           </a:p>
@@ -5878,12 +5883,12 @@
           </a:p>
           <a:p>
             <a:r>
-              <a:rPr lang="en-US" dirty="0" err="1"/>
-              <a:t>Quratulaein</a:t>
+              <a:rPr lang="en-US" dirty="0" smtClean="0"/>
+              <a:t>Quratulaien </a:t>
             </a:r>
             <a:r>
               <a:rPr lang="en-US" dirty="0"/>
-              <a:t> Fatima Shah</a:t>
+              <a:t>Fatima Shah</a:t>
             </a:r>
           </a:p>
         </p:txBody>
@@ -5958,13 +5963,29 @@
           <a:p>
             <a:r>
               <a:rPr lang="en-US" dirty="0"/>
-              <a:t>Application built to stores personal information for the user.</a:t>
-            </a:r>
-          </a:p>
-          <a:p>
+              <a:t>Application built to </a:t>
+            </a:r>
+            <a:r>
+              <a:rPr lang="en-US" dirty="0" smtClean="0"/>
+              <a:t>store </a:t>
+            </a:r>
             <a:r>
               <a:rPr lang="en-US" dirty="0"/>
-              <a:t>It is hard to remembers all the personal information a user might have.</a:t>
+              <a:t>personal information for the user.</a:t>
+            </a:r>
+          </a:p>
+          <a:p>
+            <a:r>
+              <a:rPr lang="en-US" dirty="0"/>
+              <a:t>It is hard to </a:t>
+            </a:r>
+            <a:r>
+              <a:rPr lang="en-US" dirty="0" smtClean="0"/>
+              <a:t>remember </a:t>
+            </a:r>
+            <a:r>
+              <a:rPr lang="en-US" dirty="0"/>
+              <a:t>all the personal information a user might have.</a:t>
             </a:r>
           </a:p>
           <a:p>
@@ -5997,7 +6018,15 @@
           <a:p>
             <a:r>
               <a:rPr lang="en-US" dirty="0"/>
-              <a:t>All sensitive information are encrypted. Users can additional further encrypts their data for maximum security.</a:t>
+              <a:t>All sensitive information are encrypted. Users can additional further </a:t>
+            </a:r>
+            <a:r>
+              <a:rPr lang="en-US" dirty="0" smtClean="0"/>
+              <a:t>encrypt </a:t>
+            </a:r>
+            <a:r>
+              <a:rPr lang="en-US" dirty="0"/>
+              <a:t>their data for maximum security.</a:t>
             </a:r>
           </a:p>
         </p:txBody>
@@ -6084,9 +6113,10 @@
           <a:p>
             <a:pPr lvl="1"/>
             <a:r>
-              <a:rPr lang="en-US" dirty="0"/>
-              <a:t>Websites base</a:t>
-            </a:r>
+              <a:rPr lang="en-US" dirty="0" smtClean="0"/>
+              <a:t>Website based</a:t>
+            </a:r>
+            <a:endParaRPr lang="en-US" dirty="0"/>
           </a:p>
           <a:p>
             <a:pPr lvl="1"/>
@@ -6144,6 +6174,13 @@
   <p:clrMapOvr>
     <a:masterClrMapping/>
   </p:clrMapOvr>
+  <p:timing>
+    <p:tnLst>
+      <p:par>
+        <p:cTn id="1" dur="indefinite" restart="never" nodeType="tmRoot"/>
+      </p:par>
+    </p:tnLst>
+  </p:timing>
 </p:sld>
 </file>
 
@@ -6187,25 +6224,35 @@
           </a:p>
         </p:txBody>
       </p:sp>
-      <p:sp>
-        <p:nvSpPr>
-          <p:cNvPr id="3" name="Content Placeholder 2"/>
-          <p:cNvSpPr>
-            <a:spLocks noGrp="1"/>
-          </p:cNvSpPr>
+      <p:pic>
+        <p:nvPicPr>
+          <p:cNvPr id="5" name="Content Placeholder 4"/>
+          <p:cNvPicPr>
+            <a:picLocks noGrp="1" noChangeAspect="1"/>
+          </p:cNvPicPr>
           <p:nvPr>
             <p:ph idx="1"/>
           </p:nvPr>
-        </p:nvSpPr>
-        <p:spPr/>
-        <p:txBody>
-          <a:bodyPr/>
-          <a:lstStyle/>
-          <a:p>
-            <a:endParaRPr lang="en-US"/>
-          </a:p>
-        </p:txBody>
-      </p:sp>
+        </p:nvPicPr>
+        <p:blipFill>
+          <a:blip r:embed="rId2">
+            <a:extLst>
+              <a:ext uri="{28A0092B-C50C-407E-A947-70E740481C1C}">
+                <a14:useLocalDpi xmlns:a14="http://schemas.microsoft.com/office/drawing/2010/main" val="0"/>
+              </a:ext>
+            </a:extLst>
+          </a:blip>
+          <a:stretch>
+            <a:fillRect/>
+          </a:stretch>
+        </p:blipFill>
+        <p:spPr>
+          <a:xfrm>
+            <a:off x="1083733" y="1197538"/>
+            <a:ext cx="7264399" cy="5419472"/>
+          </a:xfrm>
+        </p:spPr>
+      </p:pic>
     </p:spTree>
     <p:extLst>
       <p:ext uri="{BB962C8B-B14F-4D97-AF65-F5344CB8AC3E}">
@@ -6216,6 +6263,13 @@
   <p:clrMapOvr>
     <a:masterClrMapping/>
   </p:clrMapOvr>
+  <p:timing>
+    <p:tnLst>
+      <p:par>
+        <p:cTn id="1" dur="indefinite" restart="never" nodeType="tmRoot"/>
+      </p:par>
+    </p:tnLst>
+  </p:timing>
 </p:sld>
 </file>
 
@@ -6271,10 +6325,348 @@
         </p:nvSpPr>
         <p:spPr/>
         <p:txBody>
-          <a:bodyPr/>
-          <a:lstStyle/>
-          <a:p>
-            <a:endParaRPr lang="en-US"/>
+          <a:bodyPr>
+            <a:normAutofit lnSpcReduction="10000"/>
+          </a:bodyPr>
+          <a:lstStyle/>
+          <a:p>
+            <a:r>
+              <a:rPr lang="en-US" dirty="0" smtClean="0"/>
+              <a:t>User(</a:t>
+            </a:r>
+            <a:r>
+              <a:rPr lang="en-US" u="sng" dirty="0" smtClean="0"/>
+              <a:t>id</a:t>
+            </a:r>
+            <a:r>
+              <a:rPr lang="en-US" dirty="0" smtClean="0"/>
+              <a:t>, username, cipher)</a:t>
+            </a:r>
+          </a:p>
+          <a:p>
+            <a:r>
+              <a:rPr lang="en-US" dirty="0" smtClean="0"/>
+              <a:t>Wallet(</a:t>
+            </a:r>
+            <a:r>
+              <a:rPr lang="en-US" u="sng" dirty="0" smtClean="0"/>
+              <a:t>ID</a:t>
+            </a:r>
+            <a:r>
+              <a:rPr lang="en-US" dirty="0" smtClean="0"/>
+              <a:t>, </a:t>
+            </a:r>
+            <a:r>
+              <a:rPr lang="en-US" u="sng" dirty="0" err="1" smtClean="0"/>
+              <a:t>userID</a:t>
+            </a:r>
+            <a:r>
+              <a:rPr lang="en-US" dirty="0" smtClean="0"/>
+              <a:t>, </a:t>
+            </a:r>
+            <a:r>
+              <a:rPr lang="en-US" dirty="0" err="1" smtClean="0"/>
+              <a:t>BankName</a:t>
+            </a:r>
+            <a:r>
+              <a:rPr lang="en-US" dirty="0" smtClean="0"/>
+              <a:t>, </a:t>
+            </a:r>
+            <a:r>
+              <a:rPr lang="en-US" dirty="0" err="1" smtClean="0"/>
+              <a:t>CardType</a:t>
+            </a:r>
+            <a:r>
+              <a:rPr lang="en-US" dirty="0" smtClean="0"/>
+              <a:t>, </a:t>
+            </a:r>
+            <a:r>
+              <a:rPr lang="en-US" dirty="0" err="1" smtClean="0"/>
+              <a:t>CardNum</a:t>
+            </a:r>
+            <a:r>
+              <a:rPr lang="en-US" dirty="0" smtClean="0"/>
+              <a:t>, </a:t>
+            </a:r>
+            <a:r>
+              <a:rPr lang="en-US" dirty="0" err="1" smtClean="0"/>
+              <a:t>NameOnCard</a:t>
+            </a:r>
+            <a:r>
+              <a:rPr lang="en-US" dirty="0" smtClean="0"/>
+              <a:t>, </a:t>
+            </a:r>
+            <a:r>
+              <a:rPr lang="en-US" dirty="0" err="1" smtClean="0"/>
+              <a:t>BillAddress</a:t>
+            </a:r>
+            <a:r>
+              <a:rPr lang="en-US" dirty="0" smtClean="0"/>
+              <a:t>, </a:t>
+            </a:r>
+            <a:r>
+              <a:rPr lang="en-US" dirty="0" err="1" smtClean="0"/>
+              <a:t>SecurityCode</a:t>
+            </a:r>
+            <a:r>
+              <a:rPr lang="en-US" dirty="0" smtClean="0"/>
+              <a:t>, </a:t>
+            </a:r>
+            <a:r>
+              <a:rPr lang="en-US" dirty="0" err="1" smtClean="0"/>
+              <a:t>ExpirationDate</a:t>
+            </a:r>
+            <a:r>
+              <a:rPr lang="en-US" dirty="0" smtClean="0"/>
+              <a:t>, </a:t>
+            </a:r>
+            <a:r>
+              <a:rPr lang="en-US" dirty="0" err="1" smtClean="0"/>
+              <a:t>EncryptID</a:t>
+            </a:r>
+            <a:r>
+              <a:rPr lang="en-US" dirty="0" smtClean="0"/>
+              <a:t>, cipher)</a:t>
+            </a:r>
+          </a:p>
+          <a:p>
+            <a:r>
+              <a:rPr lang="en-US" dirty="0" smtClean="0"/>
+              <a:t>Notes(</a:t>
+            </a:r>
+            <a:r>
+              <a:rPr lang="en-US" u="sng" dirty="0" smtClean="0"/>
+              <a:t>ID</a:t>
+            </a:r>
+            <a:r>
+              <a:rPr lang="en-US" dirty="0" smtClean="0"/>
+              <a:t>, </a:t>
+            </a:r>
+            <a:r>
+              <a:rPr lang="en-US" u="sng" dirty="0" err="1" smtClean="0"/>
+              <a:t>userID</a:t>
+            </a:r>
+            <a:r>
+              <a:rPr lang="en-US" dirty="0" smtClean="0"/>
+              <a:t>, title, entry, </a:t>
+            </a:r>
+            <a:r>
+              <a:rPr lang="en-US" dirty="0" err="1" smtClean="0"/>
+              <a:t>encryptID</a:t>
+            </a:r>
+            <a:r>
+              <a:rPr lang="en-US" dirty="0" smtClean="0"/>
+              <a:t>, cipher, </a:t>
+            </a:r>
+            <a:r>
+              <a:rPr lang="en-US" dirty="0" err="1" smtClean="0"/>
+              <a:t>encryptstatus</a:t>
+            </a:r>
+            <a:r>
+              <a:rPr lang="en-US" dirty="0" smtClean="0"/>
+              <a:t>)</a:t>
+            </a:r>
+          </a:p>
+          <a:p>
+            <a:r>
+              <a:rPr lang="en-US" dirty="0" err="1" smtClean="0"/>
+              <a:t>AccountInfo</a:t>
+            </a:r>
+            <a:r>
+              <a:rPr lang="en-US" dirty="0" smtClean="0"/>
+              <a:t>(</a:t>
+            </a:r>
+            <a:r>
+              <a:rPr lang="en-US" u="sng" dirty="0" smtClean="0"/>
+              <a:t>ID</a:t>
+            </a:r>
+            <a:r>
+              <a:rPr lang="en-US" dirty="0" smtClean="0"/>
+              <a:t>, </a:t>
+            </a:r>
+            <a:r>
+              <a:rPr lang="en-US" dirty="0" err="1" smtClean="0"/>
+              <a:t>userID</a:t>
+            </a:r>
+            <a:r>
+              <a:rPr lang="en-US" dirty="0" smtClean="0"/>
+              <a:t>, </a:t>
+            </a:r>
+            <a:r>
+              <a:rPr lang="en-US" dirty="0" err="1" smtClean="0"/>
+              <a:t>CustomerName</a:t>
+            </a:r>
+            <a:r>
+              <a:rPr lang="en-US" dirty="0" smtClean="0"/>
+              <a:t>, Email, State, City, Street, </a:t>
+            </a:r>
+            <a:r>
+              <a:rPr lang="en-US" dirty="0" err="1" smtClean="0"/>
+              <a:t>Substatus</a:t>
+            </a:r>
+            <a:r>
+              <a:rPr lang="en-US" dirty="0" smtClean="0"/>
+              <a:t>, </a:t>
+            </a:r>
+            <a:r>
+              <a:rPr lang="en-US" dirty="0" err="1" smtClean="0"/>
+              <a:t>SubExpDate</a:t>
+            </a:r>
+            <a:r>
+              <a:rPr lang="en-US" dirty="0" smtClean="0"/>
+              <a:t>)</a:t>
+            </a:r>
+          </a:p>
+          <a:p>
+            <a:r>
+              <a:rPr lang="en-US" dirty="0" err="1" smtClean="0"/>
+              <a:t>PasswordEntry</a:t>
+            </a:r>
+            <a:r>
+              <a:rPr lang="en-US" dirty="0" smtClean="0"/>
+              <a:t>(</a:t>
+            </a:r>
+            <a:r>
+              <a:rPr lang="en-US" u="sng" dirty="0" smtClean="0"/>
+              <a:t>ID,</a:t>
+            </a:r>
+            <a:r>
+              <a:rPr lang="en-US" dirty="0" smtClean="0"/>
+              <a:t> </a:t>
+            </a:r>
+            <a:r>
+              <a:rPr lang="en-US" dirty="0" err="1" smtClean="0"/>
+              <a:t>DomainName</a:t>
+            </a:r>
+            <a:r>
+              <a:rPr lang="en-US" dirty="0" smtClean="0"/>
+              <a:t>, </a:t>
+            </a:r>
+            <a:r>
+              <a:rPr lang="en-US" dirty="0" err="1" smtClean="0"/>
+              <a:t>DomainUserName</a:t>
+            </a:r>
+            <a:r>
+              <a:rPr lang="en-US" dirty="0" smtClean="0"/>
+              <a:t>, Domain PW, </a:t>
+            </a:r>
+            <a:r>
+              <a:rPr lang="en-US" dirty="0" err="1" smtClean="0"/>
+              <a:t>encryptID</a:t>
+            </a:r>
+            <a:r>
+              <a:rPr lang="en-US" dirty="0" smtClean="0"/>
+              <a:t>, </a:t>
+            </a:r>
+            <a:r>
+              <a:rPr lang="en-US" dirty="0" err="1" smtClean="0"/>
+              <a:t>encryptstatus</a:t>
+            </a:r>
+            <a:r>
+              <a:rPr lang="en-US" dirty="0" smtClean="0"/>
+              <a:t>)</a:t>
+            </a:r>
+          </a:p>
+          <a:p>
+            <a:r>
+              <a:rPr lang="en-US" dirty="0" smtClean="0"/>
+              <a:t>Encryption(</a:t>
+            </a:r>
+            <a:r>
+              <a:rPr lang="en-US" u="sng" dirty="0" smtClean="0"/>
+              <a:t>ID,</a:t>
+            </a:r>
+            <a:r>
+              <a:rPr lang="en-US" dirty="0" smtClean="0"/>
+              <a:t> cipher)</a:t>
+            </a:r>
+          </a:p>
+          <a:p>
+            <a:r>
+              <a:rPr lang="en-US" dirty="0" err="1" smtClean="0"/>
+              <a:t>EncryptedWallet</a:t>
+            </a:r>
+            <a:r>
+              <a:rPr lang="en-US" dirty="0" smtClean="0"/>
+              <a:t>(</a:t>
+            </a:r>
+            <a:r>
+              <a:rPr lang="en-US" u="sng" dirty="0" smtClean="0"/>
+              <a:t>ID,</a:t>
+            </a:r>
+            <a:r>
+              <a:rPr lang="en-US" dirty="0" smtClean="0"/>
+              <a:t> </a:t>
+            </a:r>
+            <a:r>
+              <a:rPr lang="en-US" dirty="0" err="1" smtClean="0"/>
+              <a:t>encryptID</a:t>
+            </a:r>
+            <a:r>
+              <a:rPr lang="en-US" dirty="0" smtClean="0"/>
+              <a:t>, </a:t>
+            </a:r>
+            <a:r>
+              <a:rPr lang="en-US" dirty="0" err="1" smtClean="0"/>
+              <a:t>walletID</a:t>
+            </a:r>
+            <a:r>
+              <a:rPr lang="en-US" dirty="0" smtClean="0"/>
+              <a:t>, </a:t>
+            </a:r>
+            <a:r>
+              <a:rPr lang="en-US" dirty="0" err="1" smtClean="0"/>
+              <a:t>userID</a:t>
+            </a:r>
+            <a:r>
+              <a:rPr lang="en-US" dirty="0" smtClean="0"/>
+              <a:t>)</a:t>
+            </a:r>
+          </a:p>
+          <a:p>
+            <a:r>
+              <a:rPr lang="en-US" dirty="0" err="1" smtClean="0"/>
+              <a:t>EncryptedNote</a:t>
+            </a:r>
+            <a:r>
+              <a:rPr lang="en-US" dirty="0" smtClean="0"/>
+              <a:t>(</a:t>
+            </a:r>
+            <a:r>
+              <a:rPr lang="en-US" u="sng" dirty="0" smtClean="0"/>
+              <a:t>ID,</a:t>
+            </a:r>
+            <a:r>
+              <a:rPr lang="en-US" dirty="0" smtClean="0"/>
+              <a:t> </a:t>
+            </a:r>
+            <a:r>
+              <a:rPr lang="en-US" dirty="0" err="1" smtClean="0"/>
+              <a:t>encryptID</a:t>
+            </a:r>
+            <a:r>
+              <a:rPr lang="en-US" dirty="0" smtClean="0"/>
+              <a:t>, </a:t>
+            </a:r>
+            <a:r>
+              <a:rPr lang="en-US" dirty="0" err="1" smtClean="0"/>
+              <a:t>noteID</a:t>
+            </a:r>
+            <a:r>
+              <a:rPr lang="en-US" dirty="0" smtClean="0"/>
+              <a:t>, </a:t>
+            </a:r>
+            <a:r>
+              <a:rPr lang="en-US" dirty="0" err="1" smtClean="0"/>
+              <a:t>userID</a:t>
+            </a:r>
+            <a:r>
+              <a:rPr lang="en-US" dirty="0" smtClean="0"/>
+              <a:t>)</a:t>
+            </a:r>
+          </a:p>
+          <a:p>
+            <a:endParaRPr lang="en-US" dirty="0"/>
           </a:p>
         </p:txBody>
       </p:sp>
@@ -6288,6 +6680,13 @@
   <p:clrMapOvr>
     <a:masterClrMapping/>
   </p:clrMapOvr>
+  <p:timing>
+    <p:tnLst>
+      <p:par>
+        <p:cTn id="1" dur="indefinite" restart="never" nodeType="tmRoot"/>
+      </p:par>
+    </p:tnLst>
+  </p:timing>
 </p:sld>
 </file>
 
@@ -6348,19 +6747,43 @@
           <a:p>
             <a:r>
               <a:rPr lang="en-US" dirty="0"/>
-              <a:t>To ensure that the password manager will work without internet connection, we uses SQLite as our database.</a:t>
-            </a:r>
-          </a:p>
-          <a:p>
+              <a:t>To ensure that the password manager will work without internet connection, we </a:t>
+            </a:r>
+            <a:r>
+              <a:rPr lang="en-US" dirty="0" smtClean="0"/>
+              <a:t>use </a:t>
+            </a:r>
             <a:r>
               <a:rPr lang="en-US" dirty="0"/>
-              <a:t>For our demo, we chose to build a Command-Line User Interface using primarily using Java. </a:t>
+              <a:t>SQLite as our database.</a:t>
             </a:r>
           </a:p>
           <a:p>
             <a:r>
               <a:rPr lang="en-US" dirty="0"/>
-              <a:t>To ensure security of our user data, we encrypts all sensitive information that a user input.</a:t>
+              <a:t>For our demo, we chose to build a Command-Line User </a:t>
+            </a:r>
+            <a:r>
+              <a:rPr lang="en-US" dirty="0" smtClean="0"/>
+              <a:t>Interface </a:t>
+            </a:r>
+            <a:r>
+              <a:rPr lang="en-US" dirty="0"/>
+              <a:t>primarily using Java. </a:t>
+            </a:r>
+          </a:p>
+          <a:p>
+            <a:r>
+              <a:rPr lang="en-US" dirty="0"/>
+              <a:t>To ensure security of our user data, we </a:t>
+            </a:r>
+            <a:r>
+              <a:rPr lang="en-US" dirty="0" smtClean="0"/>
+              <a:t>encrypt </a:t>
+            </a:r>
+            <a:r>
+              <a:rPr lang="en-US" dirty="0"/>
+              <a:t>all sensitive information that a user input.</a:t>
             </a:r>
           </a:p>
           <a:p>
@@ -6373,8 +6796,28 @@
           <a:p>
             <a:pPr lvl="1"/>
             <a:r>
+              <a:rPr lang="en-US"/>
+              <a:t>We </a:t>
+            </a:r>
+            <a:r>
+              <a:rPr lang="en-US" smtClean="0"/>
+              <a:t>use </a:t>
+            </a:r>
+            <a:r>
               <a:rPr lang="en-US" dirty="0"/>
-              <a:t>We uses sensitive information as a key and a shared common content that we uses to encrypt and decrypt. </a:t>
+              <a:t>sensitive information as a key and a shared common content that </a:t>
+            </a:r>
+            <a:r>
+              <a:rPr lang="en-US"/>
+              <a:t>we </a:t>
+            </a:r>
+            <a:r>
+              <a:rPr lang="en-US" smtClean="0"/>
+              <a:t>use </a:t>
+            </a:r>
+            <a:r>
+              <a:rPr lang="en-US" dirty="0"/>
+              <a:t>to encrypt and decrypt. </a:t>
             </a:r>
           </a:p>
           <a:p>
@@ -6399,6 +6842,13 @@
   <p:clrMapOvr>
     <a:masterClrMapping/>
   </p:clrMapOvr>
+  <p:timing>
+    <p:tnLst>
+      <p:par>
+        <p:cTn id="1" dur="indefinite" restart="never" nodeType="tmRoot"/>
+      </p:par>
+    </p:tnLst>
+  </p:timing>
 </p:sld>
 </file>
 

</xml_diff>